<commit_message>
Create UserInfo Screen, Home Screen, Side Menu
</commit_message>
<xml_diff>
--- a/tags/document/UI design.pptx
+++ b/tags/document/UI design.pptx
@@ -246,7 +246,7 @@
           <a:p>
             <a:fld id="{DB48847E-9F21-4402-811E-732B43B93779}" type="datetimeFigureOut">
               <a:rPr lang="en-US" smtClean="0"/>
-              <a:t>6/10/2018</a:t>
+              <a:t>6/11/2018</a:t>
             </a:fld>
             <a:endParaRPr lang="en-US"/>
           </a:p>
@@ -416,7 +416,7 @@
           <a:p>
             <a:fld id="{DB48847E-9F21-4402-811E-732B43B93779}" type="datetimeFigureOut">
               <a:rPr lang="en-US" smtClean="0"/>
-              <a:t>6/10/2018</a:t>
+              <a:t>6/11/2018</a:t>
             </a:fld>
             <a:endParaRPr lang="en-US"/>
           </a:p>
@@ -596,7 +596,7 @@
           <a:p>
             <a:fld id="{DB48847E-9F21-4402-811E-732B43B93779}" type="datetimeFigureOut">
               <a:rPr lang="en-US" smtClean="0"/>
-              <a:t>6/10/2018</a:t>
+              <a:t>6/11/2018</a:t>
             </a:fld>
             <a:endParaRPr lang="en-US"/>
           </a:p>
@@ -766,7 +766,7 @@
           <a:p>
             <a:fld id="{DB48847E-9F21-4402-811E-732B43B93779}" type="datetimeFigureOut">
               <a:rPr lang="en-US" smtClean="0"/>
-              <a:t>6/10/2018</a:t>
+              <a:t>6/11/2018</a:t>
             </a:fld>
             <a:endParaRPr lang="en-US"/>
           </a:p>
@@ -1012,7 +1012,7 @@
           <a:p>
             <a:fld id="{DB48847E-9F21-4402-811E-732B43B93779}" type="datetimeFigureOut">
               <a:rPr lang="en-US" smtClean="0"/>
-              <a:t>6/10/2018</a:t>
+              <a:t>6/11/2018</a:t>
             </a:fld>
             <a:endParaRPr lang="en-US"/>
           </a:p>
@@ -1244,7 +1244,7 @@
           <a:p>
             <a:fld id="{DB48847E-9F21-4402-811E-732B43B93779}" type="datetimeFigureOut">
               <a:rPr lang="en-US" smtClean="0"/>
-              <a:t>6/10/2018</a:t>
+              <a:t>6/11/2018</a:t>
             </a:fld>
             <a:endParaRPr lang="en-US"/>
           </a:p>
@@ -1611,7 +1611,7 @@
           <a:p>
             <a:fld id="{DB48847E-9F21-4402-811E-732B43B93779}" type="datetimeFigureOut">
               <a:rPr lang="en-US" smtClean="0"/>
-              <a:t>6/10/2018</a:t>
+              <a:t>6/11/2018</a:t>
             </a:fld>
             <a:endParaRPr lang="en-US"/>
           </a:p>
@@ -1729,7 +1729,7 @@
           <a:p>
             <a:fld id="{DB48847E-9F21-4402-811E-732B43B93779}" type="datetimeFigureOut">
               <a:rPr lang="en-US" smtClean="0"/>
-              <a:t>6/10/2018</a:t>
+              <a:t>6/11/2018</a:t>
             </a:fld>
             <a:endParaRPr lang="en-US"/>
           </a:p>
@@ -1824,7 +1824,7 @@
           <a:p>
             <a:fld id="{DB48847E-9F21-4402-811E-732B43B93779}" type="datetimeFigureOut">
               <a:rPr lang="en-US" smtClean="0"/>
-              <a:t>6/10/2018</a:t>
+              <a:t>6/11/2018</a:t>
             </a:fld>
             <a:endParaRPr lang="en-US"/>
           </a:p>
@@ -2101,7 +2101,7 @@
           <a:p>
             <a:fld id="{DB48847E-9F21-4402-811E-732B43B93779}" type="datetimeFigureOut">
               <a:rPr lang="en-US" smtClean="0"/>
-              <a:t>6/10/2018</a:t>
+              <a:t>6/11/2018</a:t>
             </a:fld>
             <a:endParaRPr lang="en-US"/>
           </a:p>
@@ -2354,7 +2354,7 @@
           <a:p>
             <a:fld id="{DB48847E-9F21-4402-811E-732B43B93779}" type="datetimeFigureOut">
               <a:rPr lang="en-US" smtClean="0"/>
-              <a:t>6/10/2018</a:t>
+              <a:t>6/11/2018</a:t>
             </a:fld>
             <a:endParaRPr lang="en-US"/>
           </a:p>
@@ -2567,7 +2567,7 @@
           <a:p>
             <a:fld id="{DB48847E-9F21-4402-811E-732B43B93779}" type="datetimeFigureOut">
               <a:rPr lang="en-US" smtClean="0"/>
-              <a:t>6/10/2018</a:t>
+              <a:t>6/11/2018</a:t>
             </a:fld>
             <a:endParaRPr lang="en-US"/>
           </a:p>
@@ -3166,6 +3166,654 @@
           </a:p>
         </p:txBody>
       </p:sp>
+      <p:pic>
+        <p:nvPicPr>
+          <p:cNvPr id="36" name="Picture 35"/>
+          <p:cNvPicPr>
+            <a:picLocks noChangeAspect="1"/>
+          </p:cNvPicPr>
+          <p:nvPr/>
+        </p:nvPicPr>
+        <p:blipFill>
+          <a:blip r:embed="rId2" cstate="print">
+            <a:extLst>
+              <a:ext uri="{28A0092B-C50C-407E-A947-70E740481C1C}">
+                <a14:useLocalDpi xmlns:a14="http://schemas.microsoft.com/office/drawing/2010/main" val="0"/>
+              </a:ext>
+            </a:extLst>
+          </a:blip>
+          <a:stretch>
+            <a:fillRect/>
+          </a:stretch>
+        </p:blipFill>
+        <p:spPr>
+          <a:xfrm>
+            <a:off x="6934100" y="0"/>
+            <a:ext cx="3372322" cy="6858000"/>
+          </a:xfrm>
+          <a:prstGeom prst="rect">
+            <a:avLst/>
+          </a:prstGeom>
+        </p:spPr>
+      </p:pic>
+      <p:sp>
+        <p:nvSpPr>
+          <p:cNvPr id="37" name="Rectangle 36"/>
+          <p:cNvSpPr/>
+          <p:nvPr/>
+        </p:nvSpPr>
+        <p:spPr>
+          <a:xfrm>
+            <a:off x="7075780" y="682580"/>
+            <a:ext cx="3072774" cy="5537916"/>
+          </a:xfrm>
+          <a:prstGeom prst="rect">
+            <a:avLst/>
+          </a:prstGeom>
+          <a:solidFill>
+            <a:schemeClr val="bg1"/>
+          </a:solidFill>
+          <a:ln>
+            <a:noFill/>
+          </a:ln>
+        </p:spPr>
+        <p:style>
+          <a:lnRef idx="2">
+            <a:schemeClr val="accent1">
+              <a:shade val="50000"/>
+            </a:schemeClr>
+          </a:lnRef>
+          <a:fillRef idx="1">
+            <a:schemeClr val="accent1"/>
+          </a:fillRef>
+          <a:effectRef idx="0">
+            <a:schemeClr val="accent1"/>
+          </a:effectRef>
+          <a:fontRef idx="minor">
+            <a:schemeClr val="lt1"/>
+          </a:fontRef>
+        </p:style>
+        <p:txBody>
+          <a:bodyPr rtlCol="0" anchor="ctr"/>
+          <a:lstStyle/>
+          <a:p>
+            <a:pPr algn="ctr"/>
+            <a:endParaRPr lang="en-US" dirty="0"/>
+          </a:p>
+        </p:txBody>
+      </p:sp>
+      <p:grpSp>
+        <p:nvGrpSpPr>
+          <p:cNvPr id="38" name="Group 37"/>
+          <p:cNvGrpSpPr/>
+          <p:nvPr/>
+        </p:nvGrpSpPr>
+        <p:grpSpPr>
+          <a:xfrm>
+            <a:off x="7179755" y="1157287"/>
+            <a:ext cx="361157" cy="249238"/>
+            <a:chOff x="1100926" y="1157287"/>
+            <a:chExt cx="361157" cy="249238"/>
+          </a:xfrm>
+          <a:solidFill>
+            <a:srgbClr val="2980B9"/>
+          </a:solidFill>
+        </p:grpSpPr>
+        <p:sp>
+          <p:nvSpPr>
+            <p:cNvPr id="39" name="Minus 38"/>
+            <p:cNvSpPr/>
+            <p:nvPr/>
+          </p:nvSpPr>
+          <p:spPr>
+            <a:xfrm>
+              <a:off x="1100926" y="1157287"/>
+              <a:ext cx="361157" cy="103188"/>
+            </a:xfrm>
+            <a:prstGeom prst="mathMinus">
+              <a:avLst/>
+            </a:prstGeom>
+            <a:grpFill/>
+            <a:ln>
+              <a:noFill/>
+            </a:ln>
+          </p:spPr>
+          <p:style>
+            <a:lnRef idx="2">
+              <a:schemeClr val="accent1">
+                <a:shade val="50000"/>
+              </a:schemeClr>
+            </a:lnRef>
+            <a:fillRef idx="1">
+              <a:schemeClr val="accent1"/>
+            </a:fillRef>
+            <a:effectRef idx="0">
+              <a:schemeClr val="accent1"/>
+            </a:effectRef>
+            <a:fontRef idx="minor">
+              <a:schemeClr val="lt1"/>
+            </a:fontRef>
+          </p:style>
+          <p:txBody>
+            <a:bodyPr rtlCol="0" anchor="ctr"/>
+            <a:lstStyle/>
+            <a:p>
+              <a:pPr algn="ctr"/>
+              <a:endParaRPr lang="en-US"/>
+            </a:p>
+          </p:txBody>
+        </p:sp>
+        <p:sp>
+          <p:nvSpPr>
+            <p:cNvPr id="40" name="Minus 39"/>
+            <p:cNvSpPr/>
+            <p:nvPr/>
+          </p:nvSpPr>
+          <p:spPr>
+            <a:xfrm>
+              <a:off x="1100926" y="1227137"/>
+              <a:ext cx="361157" cy="103188"/>
+            </a:xfrm>
+            <a:prstGeom prst="mathMinus">
+              <a:avLst/>
+            </a:prstGeom>
+            <a:grpFill/>
+            <a:ln>
+              <a:noFill/>
+            </a:ln>
+          </p:spPr>
+          <p:style>
+            <a:lnRef idx="2">
+              <a:schemeClr val="accent1">
+                <a:shade val="50000"/>
+              </a:schemeClr>
+            </a:lnRef>
+            <a:fillRef idx="1">
+              <a:schemeClr val="accent1"/>
+            </a:fillRef>
+            <a:effectRef idx="0">
+              <a:schemeClr val="accent1"/>
+            </a:effectRef>
+            <a:fontRef idx="minor">
+              <a:schemeClr val="lt1"/>
+            </a:fontRef>
+          </p:style>
+          <p:txBody>
+            <a:bodyPr rtlCol="0" anchor="ctr"/>
+            <a:lstStyle/>
+            <a:p>
+              <a:pPr algn="ctr"/>
+              <a:endParaRPr lang="en-US"/>
+            </a:p>
+          </p:txBody>
+        </p:sp>
+        <p:sp>
+          <p:nvSpPr>
+            <p:cNvPr id="41" name="Minus 40"/>
+            <p:cNvSpPr/>
+            <p:nvPr/>
+          </p:nvSpPr>
+          <p:spPr>
+            <a:xfrm>
+              <a:off x="1100926" y="1303337"/>
+              <a:ext cx="361157" cy="103188"/>
+            </a:xfrm>
+            <a:prstGeom prst="mathMinus">
+              <a:avLst/>
+            </a:prstGeom>
+            <a:grpFill/>
+            <a:ln>
+              <a:noFill/>
+            </a:ln>
+          </p:spPr>
+          <p:style>
+            <a:lnRef idx="2">
+              <a:schemeClr val="accent1">
+                <a:shade val="50000"/>
+              </a:schemeClr>
+            </a:lnRef>
+            <a:fillRef idx="1">
+              <a:schemeClr val="accent1"/>
+            </a:fillRef>
+            <a:effectRef idx="0">
+              <a:schemeClr val="accent1"/>
+            </a:effectRef>
+            <a:fontRef idx="minor">
+              <a:schemeClr val="lt1"/>
+            </a:fontRef>
+          </p:style>
+          <p:txBody>
+            <a:bodyPr rtlCol="0" anchor="ctr"/>
+            <a:lstStyle/>
+            <a:p>
+              <a:pPr algn="ctr"/>
+              <a:endParaRPr lang="en-US"/>
+            </a:p>
+          </p:txBody>
+        </p:sp>
+      </p:grpSp>
+      <p:sp>
+        <p:nvSpPr>
+          <p:cNvPr id="42" name="TextBox 41"/>
+          <p:cNvSpPr txBox="1"/>
+          <p:nvPr/>
+        </p:nvSpPr>
+        <p:spPr>
+          <a:xfrm>
+            <a:off x="7993594" y="1119476"/>
+            <a:ext cx="1276350" cy="338554"/>
+          </a:xfrm>
+          <a:prstGeom prst="rect">
+            <a:avLst/>
+          </a:prstGeom>
+          <a:noFill/>
+        </p:spPr>
+        <p:txBody>
+          <a:bodyPr wrap="square" rtlCol="0">
+            <a:spAutoFit/>
+          </a:bodyPr>
+          <a:lstStyle/>
+          <a:p>
+            <a:r>
+              <a:rPr lang="en-US" sz="1600" b="1" dirty="0" smtClean="0">
+                <a:solidFill>
+                  <a:srgbClr val="2980B9"/>
+                </a:solidFill>
+                <a:latin typeface="Segoe UI" panose="020B0502040204020203" pitchFamily="34" charset="0"/>
+                <a:cs typeface="Segoe UI" panose="020B0502040204020203" pitchFamily="34" charset="0"/>
+              </a:rPr>
+              <a:t>Mad App</a:t>
+            </a:r>
+            <a:endParaRPr lang="en-US" sz="1600" b="1" dirty="0">
+              <a:solidFill>
+                <a:srgbClr val="2980B9"/>
+              </a:solidFill>
+              <a:latin typeface="Segoe UI" panose="020B0502040204020203" pitchFamily="34" charset="0"/>
+              <a:cs typeface="Segoe UI" panose="020B0502040204020203" pitchFamily="34" charset="0"/>
+            </a:endParaRPr>
+          </a:p>
+        </p:txBody>
+      </p:sp>
+      <p:sp>
+        <p:nvSpPr>
+          <p:cNvPr id="43" name="Rectangle 42"/>
+          <p:cNvSpPr/>
+          <p:nvPr/>
+        </p:nvSpPr>
+        <p:spPr>
+          <a:xfrm>
+            <a:off x="8124081" y="2595379"/>
+            <a:ext cx="1780314" cy="354725"/>
+          </a:xfrm>
+          <a:prstGeom prst="rect">
+            <a:avLst/>
+          </a:prstGeom>
+          <a:solidFill>
+            <a:schemeClr val="bg1"/>
+          </a:solidFill>
+          <a:ln>
+            <a:noFill/>
+          </a:ln>
+        </p:spPr>
+        <p:style>
+          <a:lnRef idx="2">
+            <a:schemeClr val="accent1">
+              <a:shade val="50000"/>
+            </a:schemeClr>
+          </a:lnRef>
+          <a:fillRef idx="1">
+            <a:schemeClr val="accent1"/>
+          </a:fillRef>
+          <a:effectRef idx="0">
+            <a:schemeClr val="accent1"/>
+          </a:effectRef>
+          <a:fontRef idx="minor">
+            <a:schemeClr val="lt1"/>
+          </a:fontRef>
+        </p:style>
+        <p:txBody>
+          <a:bodyPr rtlCol="0" anchor="b"/>
+          <a:lstStyle/>
+          <a:p>
+            <a:pPr algn="ctr"/>
+            <a:r>
+              <a:rPr lang="en-US" sz="1600" b="1" dirty="0" smtClean="0">
+                <a:solidFill>
+                  <a:srgbClr val="2980B9"/>
+                </a:solidFill>
+                <a:latin typeface="Segoe UI" panose="020B0502040204020203" pitchFamily="34" charset="0"/>
+                <a:cs typeface="Segoe UI" panose="020B0502040204020203" pitchFamily="34" charset="0"/>
+              </a:rPr>
+              <a:t>Mua Hàng</a:t>
+            </a:r>
+            <a:endParaRPr lang="en-US" sz="1600" b="1" dirty="0">
+              <a:solidFill>
+                <a:srgbClr val="2980B9"/>
+              </a:solidFill>
+              <a:latin typeface="Segoe UI" panose="020B0502040204020203" pitchFamily="34" charset="0"/>
+              <a:cs typeface="Segoe UI" panose="020B0502040204020203" pitchFamily="34" charset="0"/>
+            </a:endParaRPr>
+          </a:p>
+        </p:txBody>
+      </p:sp>
+      <p:sp>
+        <p:nvSpPr>
+          <p:cNvPr id="44" name="Rectangle 43"/>
+          <p:cNvSpPr/>
+          <p:nvPr/>
+        </p:nvSpPr>
+        <p:spPr>
+          <a:xfrm>
+            <a:off x="8190895" y="3546842"/>
+            <a:ext cx="1545336" cy="429094"/>
+          </a:xfrm>
+          <a:prstGeom prst="rect">
+            <a:avLst/>
+          </a:prstGeom>
+          <a:solidFill>
+            <a:schemeClr val="bg1"/>
+          </a:solidFill>
+          <a:ln>
+            <a:noFill/>
+          </a:ln>
+        </p:spPr>
+        <p:style>
+          <a:lnRef idx="2">
+            <a:schemeClr val="accent1">
+              <a:shade val="50000"/>
+            </a:schemeClr>
+          </a:lnRef>
+          <a:fillRef idx="1">
+            <a:schemeClr val="accent1"/>
+          </a:fillRef>
+          <a:effectRef idx="0">
+            <a:schemeClr val="accent1"/>
+          </a:effectRef>
+          <a:fontRef idx="minor">
+            <a:schemeClr val="lt1"/>
+          </a:fontRef>
+        </p:style>
+        <p:txBody>
+          <a:bodyPr rtlCol="0" anchor="b"/>
+          <a:lstStyle/>
+          <a:p>
+            <a:pPr algn="ctr"/>
+            <a:r>
+              <a:rPr lang="en-US" sz="1600" b="1" dirty="0" smtClean="0">
+                <a:solidFill>
+                  <a:srgbClr val="2980B9"/>
+                </a:solidFill>
+                <a:latin typeface="Segoe UI" panose="020B0502040204020203" pitchFamily="34" charset="0"/>
+                <a:cs typeface="Segoe UI" panose="020B0502040204020203" pitchFamily="34" charset="0"/>
+              </a:rPr>
+              <a:t>Sửa chữa</a:t>
+            </a:r>
+            <a:endParaRPr lang="en-US" sz="1600" b="1" dirty="0">
+              <a:solidFill>
+                <a:srgbClr val="2980B9"/>
+              </a:solidFill>
+              <a:latin typeface="Segoe UI" panose="020B0502040204020203" pitchFamily="34" charset="0"/>
+              <a:cs typeface="Segoe UI" panose="020B0502040204020203" pitchFamily="34" charset="0"/>
+            </a:endParaRPr>
+          </a:p>
+        </p:txBody>
+      </p:sp>
+      <p:sp>
+        <p:nvSpPr>
+          <p:cNvPr id="45" name="Rectangle 44"/>
+          <p:cNvSpPr/>
+          <p:nvPr/>
+        </p:nvSpPr>
+        <p:spPr>
+          <a:xfrm>
+            <a:off x="8199295" y="4683442"/>
+            <a:ext cx="1528535" cy="453003"/>
+          </a:xfrm>
+          <a:prstGeom prst="rect">
+            <a:avLst/>
+          </a:prstGeom>
+          <a:solidFill>
+            <a:schemeClr val="bg1"/>
+          </a:solidFill>
+          <a:ln>
+            <a:noFill/>
+          </a:ln>
+        </p:spPr>
+        <p:style>
+          <a:lnRef idx="2">
+            <a:schemeClr val="accent1">
+              <a:shade val="50000"/>
+            </a:schemeClr>
+          </a:lnRef>
+          <a:fillRef idx="1">
+            <a:schemeClr val="accent1"/>
+          </a:fillRef>
+          <a:effectRef idx="0">
+            <a:schemeClr val="accent1"/>
+          </a:effectRef>
+          <a:fontRef idx="minor">
+            <a:schemeClr val="lt1"/>
+          </a:fontRef>
+        </p:style>
+        <p:txBody>
+          <a:bodyPr rtlCol="0" anchor="b"/>
+          <a:lstStyle/>
+          <a:p>
+            <a:pPr algn="ctr"/>
+            <a:r>
+              <a:rPr lang="en-US" sz="1600" b="1" dirty="0" smtClean="0">
+                <a:solidFill>
+                  <a:srgbClr val="2980B9"/>
+                </a:solidFill>
+                <a:latin typeface="Segoe UI" panose="020B0502040204020203" pitchFamily="34" charset="0"/>
+                <a:cs typeface="Segoe UI" panose="020B0502040204020203" pitchFamily="34" charset="0"/>
+              </a:rPr>
+              <a:t>Liên Hệ</a:t>
+            </a:r>
+            <a:endParaRPr lang="en-US" sz="1600" b="1" dirty="0">
+              <a:solidFill>
+                <a:srgbClr val="2980B9"/>
+              </a:solidFill>
+              <a:latin typeface="Segoe UI" panose="020B0502040204020203" pitchFamily="34" charset="0"/>
+              <a:cs typeface="Segoe UI" panose="020B0502040204020203" pitchFamily="34" charset="0"/>
+            </a:endParaRPr>
+          </a:p>
+        </p:txBody>
+      </p:sp>
+      <p:pic>
+        <p:nvPicPr>
+          <p:cNvPr id="46" name="Picture 45"/>
+          <p:cNvPicPr>
+            <a:picLocks noChangeAspect="1"/>
+          </p:cNvPicPr>
+          <p:nvPr/>
+        </p:nvPicPr>
+        <p:blipFill>
+          <a:blip r:embed="rId4" cstate="print">
+            <a:extLst>
+              <a:ext uri="{28A0092B-C50C-407E-A947-70E740481C1C}">
+                <a14:useLocalDpi xmlns:a14="http://schemas.microsoft.com/office/drawing/2010/main" val="0"/>
+              </a:ext>
+            </a:extLst>
+          </a:blip>
+          <a:stretch>
+            <a:fillRect/>
+          </a:stretch>
+        </p:blipFill>
+        <p:spPr>
+          <a:xfrm>
+            <a:off x="7540912" y="2412559"/>
+            <a:ext cx="712838" cy="712838"/>
+          </a:xfrm>
+          <a:prstGeom prst="rect">
+            <a:avLst/>
+          </a:prstGeom>
+        </p:spPr>
+      </p:pic>
+      <p:pic>
+        <p:nvPicPr>
+          <p:cNvPr id="47" name="Picture 46"/>
+          <p:cNvPicPr>
+            <a:picLocks noChangeAspect="1"/>
+          </p:cNvPicPr>
+          <p:nvPr/>
+        </p:nvPicPr>
+        <p:blipFill>
+          <a:blip r:embed="rId5" cstate="print">
+            <a:extLst>
+              <a:ext uri="{BEBA8EAE-BF5A-486C-A8C5-ECC9F3942E4B}">
+                <a14:imgProps xmlns:a14="http://schemas.microsoft.com/office/drawing/2010/main">
+                  <a14:imgLayer r:embed="rId6">
+                    <a14:imgEffect>
+                      <a14:brightnessContrast contrast="-40000"/>
+                    </a14:imgEffect>
+                  </a14:imgLayer>
+                </a14:imgProps>
+              </a:ext>
+              <a:ext uri="{28A0092B-C50C-407E-A947-70E740481C1C}">
+                <a14:useLocalDpi xmlns:a14="http://schemas.microsoft.com/office/drawing/2010/main" val="0"/>
+              </a:ext>
+            </a:extLst>
+          </a:blip>
+          <a:stretch>
+            <a:fillRect/>
+          </a:stretch>
+        </p:blipFill>
+        <p:spPr>
+          <a:xfrm>
+            <a:off x="7557010" y="3437438"/>
+            <a:ext cx="722549" cy="722549"/>
+          </a:xfrm>
+          <a:prstGeom prst="rect">
+            <a:avLst/>
+          </a:prstGeom>
+        </p:spPr>
+      </p:pic>
+      <p:pic>
+        <p:nvPicPr>
+          <p:cNvPr id="48" name="Picture 47"/>
+          <p:cNvPicPr>
+            <a:picLocks noChangeAspect="1"/>
+          </p:cNvPicPr>
+          <p:nvPr/>
+        </p:nvPicPr>
+        <p:blipFill>
+          <a:blip r:embed="rId7" cstate="print">
+            <a:extLst>
+              <a:ext uri="{BEBA8EAE-BF5A-486C-A8C5-ECC9F3942E4B}">
+                <a14:imgProps xmlns:a14="http://schemas.microsoft.com/office/drawing/2010/main">
+                  <a14:imgLayer r:embed="rId8">
+                    <a14:imgEffect>
+                      <a14:brightnessContrast contrast="-40000"/>
+                    </a14:imgEffect>
+                  </a14:imgLayer>
+                </a14:imgProps>
+              </a:ext>
+              <a:ext uri="{28A0092B-C50C-407E-A947-70E740481C1C}">
+                <a14:useLocalDpi xmlns:a14="http://schemas.microsoft.com/office/drawing/2010/main" val="0"/>
+              </a:ext>
+            </a:extLst>
+          </a:blip>
+          <a:stretch>
+            <a:fillRect/>
+          </a:stretch>
+        </p:blipFill>
+        <p:spPr>
+          <a:xfrm>
+            <a:off x="7622473" y="4503785"/>
+            <a:ext cx="727539" cy="727539"/>
+          </a:xfrm>
+          <a:prstGeom prst="rect">
+            <a:avLst/>
+          </a:prstGeom>
+        </p:spPr>
+      </p:pic>
+      <p:pic>
+        <p:nvPicPr>
+          <p:cNvPr id="49" name="Picture 48"/>
+          <p:cNvPicPr>
+            <a:picLocks noChangeAspect="1"/>
+          </p:cNvPicPr>
+          <p:nvPr/>
+        </p:nvPicPr>
+        <p:blipFill>
+          <a:blip r:embed="rId9" cstate="print">
+            <a:extLst>
+              <a:ext uri="{28A0092B-C50C-407E-A947-70E740481C1C}">
+                <a14:useLocalDpi xmlns:a14="http://schemas.microsoft.com/office/drawing/2010/main" val="0"/>
+              </a:ext>
+            </a:extLst>
+          </a:blip>
+          <a:stretch>
+            <a:fillRect/>
+          </a:stretch>
+        </p:blipFill>
+        <p:spPr>
+          <a:xfrm>
+            <a:off x="9596211" y="1071685"/>
+            <a:ext cx="372462" cy="371610"/>
+          </a:xfrm>
+          <a:prstGeom prst="rect">
+            <a:avLst/>
+          </a:prstGeom>
+        </p:spPr>
+      </p:pic>
+      <p:sp>
+        <p:nvSpPr>
+          <p:cNvPr id="50" name="Oval 49"/>
+          <p:cNvSpPr/>
+          <p:nvPr/>
+        </p:nvSpPr>
+        <p:spPr>
+          <a:xfrm>
+            <a:off x="9839672" y="962895"/>
+            <a:ext cx="207935" cy="217579"/>
+          </a:xfrm>
+          <a:prstGeom prst="ellipse">
+            <a:avLst/>
+          </a:prstGeom>
+          <a:solidFill>
+            <a:schemeClr val="accent2"/>
+          </a:solidFill>
+          <a:ln>
+            <a:noFill/>
+          </a:ln>
+        </p:spPr>
+        <p:style>
+          <a:lnRef idx="2">
+            <a:schemeClr val="accent1">
+              <a:shade val="50000"/>
+            </a:schemeClr>
+          </a:lnRef>
+          <a:fillRef idx="1">
+            <a:schemeClr val="accent1"/>
+          </a:fillRef>
+          <a:effectRef idx="0">
+            <a:schemeClr val="accent1"/>
+          </a:effectRef>
+          <a:fontRef idx="minor">
+            <a:schemeClr val="lt1"/>
+          </a:fontRef>
+        </p:style>
+        <p:txBody>
+          <a:bodyPr rtlCol="0" anchor="ctr"/>
+          <a:lstStyle/>
+          <a:p>
+            <a:pPr algn="ctr"/>
+            <a:r>
+              <a:rPr lang="en-US" sz="800" b="1" dirty="0" smtClean="0">
+                <a:latin typeface="Segoe UI" panose="020B0502040204020203" pitchFamily="34" charset="0"/>
+                <a:cs typeface="Segoe UI" panose="020B0502040204020203" pitchFamily="34" charset="0"/>
+              </a:rPr>
+              <a:t>2</a:t>
+            </a:r>
+            <a:endParaRPr lang="en-US" sz="800" b="1" dirty="0">
+              <a:latin typeface="Segoe UI" panose="020B0502040204020203" pitchFamily="34" charset="0"/>
+              <a:cs typeface="Segoe UI" panose="020B0502040204020203" pitchFamily="34" charset="0"/>
+            </a:endParaRPr>
+          </a:p>
+        </p:txBody>
+      </p:sp>
     </p:spTree>
     <p:extLst>
       <p:ext uri="{BB962C8B-B14F-4D97-AF65-F5344CB8AC3E}">
@@ -3272,144 +3920,156 @@
           </a:p>
         </p:txBody>
       </p:sp>
-      <p:sp>
-        <p:nvSpPr>
-          <p:cNvPr id="10" name="Minus 9"/>
-          <p:cNvSpPr/>
-          <p:nvPr/>
-        </p:nvSpPr>
-        <p:spPr>
+      <p:grpSp>
+        <p:nvGrpSpPr>
+          <p:cNvPr id="2" name="Group 1"/>
+          <p:cNvGrpSpPr/>
+          <p:nvPr/>
+        </p:nvGrpSpPr>
+        <p:grpSpPr>
           <a:xfrm>
             <a:off x="1100926" y="1157287"/>
-            <a:ext cx="361157" cy="103188"/>
-          </a:xfrm>
-          <a:prstGeom prst="mathMinus">
-            <a:avLst/>
-          </a:prstGeom>
+            <a:ext cx="361157" cy="249238"/>
+            <a:chOff x="1100926" y="1157287"/>
+            <a:chExt cx="361157" cy="249238"/>
+          </a:xfrm>
           <a:solidFill>
             <a:srgbClr val="2980B9"/>
           </a:solidFill>
-          <a:ln>
-            <a:noFill/>
-          </a:ln>
-        </p:spPr>
-        <p:style>
-          <a:lnRef idx="2">
-            <a:schemeClr val="accent1">
-              <a:shade val="50000"/>
-            </a:schemeClr>
-          </a:lnRef>
-          <a:fillRef idx="1">
-            <a:schemeClr val="accent1"/>
-          </a:fillRef>
-          <a:effectRef idx="0">
-            <a:schemeClr val="accent1"/>
-          </a:effectRef>
-          <a:fontRef idx="minor">
-            <a:schemeClr val="lt1"/>
-          </a:fontRef>
-        </p:style>
-        <p:txBody>
-          <a:bodyPr rtlCol="0" anchor="ctr"/>
-          <a:lstStyle/>
-          <a:p>
-            <a:pPr algn="ctr"/>
-            <a:endParaRPr lang="en-US"/>
-          </a:p>
-        </p:txBody>
-      </p:sp>
-      <p:sp>
-        <p:nvSpPr>
-          <p:cNvPr id="11" name="Minus 10"/>
-          <p:cNvSpPr/>
-          <p:nvPr/>
-        </p:nvSpPr>
-        <p:spPr>
-          <a:xfrm>
-            <a:off x="1100926" y="1227137"/>
-            <a:ext cx="361157" cy="103188"/>
-          </a:xfrm>
-          <a:prstGeom prst="mathMinus">
-            <a:avLst/>
-          </a:prstGeom>
-          <a:solidFill>
-            <a:srgbClr val="2980B9"/>
-          </a:solidFill>
-          <a:ln>
-            <a:noFill/>
-          </a:ln>
-        </p:spPr>
-        <p:style>
-          <a:lnRef idx="2">
-            <a:schemeClr val="accent1">
-              <a:shade val="50000"/>
-            </a:schemeClr>
-          </a:lnRef>
-          <a:fillRef idx="1">
-            <a:schemeClr val="accent1"/>
-          </a:fillRef>
-          <a:effectRef idx="0">
-            <a:schemeClr val="accent1"/>
-          </a:effectRef>
-          <a:fontRef idx="minor">
-            <a:schemeClr val="lt1"/>
-          </a:fontRef>
-        </p:style>
-        <p:txBody>
-          <a:bodyPr rtlCol="0" anchor="ctr"/>
-          <a:lstStyle/>
-          <a:p>
-            <a:pPr algn="ctr"/>
-            <a:endParaRPr lang="en-US"/>
-          </a:p>
-        </p:txBody>
-      </p:sp>
-      <p:sp>
-        <p:nvSpPr>
-          <p:cNvPr id="12" name="Minus 11"/>
-          <p:cNvSpPr/>
-          <p:nvPr/>
-        </p:nvSpPr>
-        <p:spPr>
-          <a:xfrm>
-            <a:off x="1100926" y="1303337"/>
-            <a:ext cx="361157" cy="103188"/>
-          </a:xfrm>
-          <a:prstGeom prst="mathMinus">
-            <a:avLst/>
-          </a:prstGeom>
-          <a:solidFill>
-            <a:srgbClr val="2980B9"/>
-          </a:solidFill>
-          <a:ln>
-            <a:noFill/>
-          </a:ln>
-        </p:spPr>
-        <p:style>
-          <a:lnRef idx="2">
-            <a:schemeClr val="accent1">
-              <a:shade val="50000"/>
-            </a:schemeClr>
-          </a:lnRef>
-          <a:fillRef idx="1">
-            <a:schemeClr val="accent1"/>
-          </a:fillRef>
-          <a:effectRef idx="0">
-            <a:schemeClr val="accent1"/>
-          </a:effectRef>
-          <a:fontRef idx="minor">
-            <a:schemeClr val="lt1"/>
-          </a:fontRef>
-        </p:style>
-        <p:txBody>
-          <a:bodyPr rtlCol="0" anchor="ctr"/>
-          <a:lstStyle/>
-          <a:p>
-            <a:pPr algn="ctr"/>
-            <a:endParaRPr lang="en-US"/>
-          </a:p>
-        </p:txBody>
-      </p:sp>
+        </p:grpSpPr>
+        <p:sp>
+          <p:nvSpPr>
+            <p:cNvPr id="10" name="Minus 9"/>
+            <p:cNvSpPr/>
+            <p:nvPr/>
+          </p:nvSpPr>
+          <p:spPr>
+            <a:xfrm>
+              <a:off x="1100926" y="1157287"/>
+              <a:ext cx="361157" cy="103188"/>
+            </a:xfrm>
+            <a:prstGeom prst="mathMinus">
+              <a:avLst/>
+            </a:prstGeom>
+            <a:grpFill/>
+            <a:ln>
+              <a:noFill/>
+            </a:ln>
+          </p:spPr>
+          <p:style>
+            <a:lnRef idx="2">
+              <a:schemeClr val="accent1">
+                <a:shade val="50000"/>
+              </a:schemeClr>
+            </a:lnRef>
+            <a:fillRef idx="1">
+              <a:schemeClr val="accent1"/>
+            </a:fillRef>
+            <a:effectRef idx="0">
+              <a:schemeClr val="accent1"/>
+            </a:effectRef>
+            <a:fontRef idx="minor">
+              <a:schemeClr val="lt1"/>
+            </a:fontRef>
+          </p:style>
+          <p:txBody>
+            <a:bodyPr rtlCol="0" anchor="ctr"/>
+            <a:lstStyle/>
+            <a:p>
+              <a:pPr algn="ctr"/>
+              <a:endParaRPr lang="en-US"/>
+            </a:p>
+          </p:txBody>
+        </p:sp>
+        <p:sp>
+          <p:nvSpPr>
+            <p:cNvPr id="11" name="Minus 10"/>
+            <p:cNvSpPr/>
+            <p:nvPr/>
+          </p:nvSpPr>
+          <p:spPr>
+            <a:xfrm>
+              <a:off x="1100926" y="1227137"/>
+              <a:ext cx="361157" cy="103188"/>
+            </a:xfrm>
+            <a:prstGeom prst="mathMinus">
+              <a:avLst/>
+            </a:prstGeom>
+            <a:grpFill/>
+            <a:ln>
+              <a:noFill/>
+            </a:ln>
+          </p:spPr>
+          <p:style>
+            <a:lnRef idx="2">
+              <a:schemeClr val="accent1">
+                <a:shade val="50000"/>
+              </a:schemeClr>
+            </a:lnRef>
+            <a:fillRef idx="1">
+              <a:schemeClr val="accent1"/>
+            </a:fillRef>
+            <a:effectRef idx="0">
+              <a:schemeClr val="accent1"/>
+            </a:effectRef>
+            <a:fontRef idx="minor">
+              <a:schemeClr val="lt1"/>
+            </a:fontRef>
+          </p:style>
+          <p:txBody>
+            <a:bodyPr rtlCol="0" anchor="ctr"/>
+            <a:lstStyle/>
+            <a:p>
+              <a:pPr algn="ctr"/>
+              <a:endParaRPr lang="en-US"/>
+            </a:p>
+          </p:txBody>
+        </p:sp>
+        <p:sp>
+          <p:nvSpPr>
+            <p:cNvPr id="12" name="Minus 11"/>
+            <p:cNvSpPr/>
+            <p:nvPr/>
+          </p:nvSpPr>
+          <p:spPr>
+            <a:xfrm>
+              <a:off x="1100926" y="1303337"/>
+              <a:ext cx="361157" cy="103188"/>
+            </a:xfrm>
+            <a:prstGeom prst="mathMinus">
+              <a:avLst/>
+            </a:prstGeom>
+            <a:grpFill/>
+            <a:ln>
+              <a:noFill/>
+            </a:ln>
+          </p:spPr>
+          <p:style>
+            <a:lnRef idx="2">
+              <a:schemeClr val="accent1">
+                <a:shade val="50000"/>
+              </a:schemeClr>
+            </a:lnRef>
+            <a:fillRef idx="1">
+              <a:schemeClr val="accent1"/>
+            </a:fillRef>
+            <a:effectRef idx="0">
+              <a:schemeClr val="accent1"/>
+            </a:effectRef>
+            <a:fontRef idx="minor">
+              <a:schemeClr val="lt1"/>
+            </a:fontRef>
+          </p:style>
+          <p:txBody>
+            <a:bodyPr rtlCol="0" anchor="ctr"/>
+            <a:lstStyle/>
+            <a:p>
+              <a:pPr algn="ctr"/>
+              <a:endParaRPr lang="en-US"/>
+            </a:p>
+          </p:txBody>
+        </p:sp>
+      </p:grpSp>
       <p:sp>
         <p:nvSpPr>
           <p:cNvPr id="13" name="TextBox 12"/>
@@ -3461,13 +4121,13 @@
         <p:spPr>
           <a:xfrm>
             <a:off x="996949" y="1735182"/>
-            <a:ext cx="3072775" cy="2931306"/>
+            <a:ext cx="3072775" cy="2377395"/>
           </a:xfrm>
           <a:prstGeom prst="rect">
             <a:avLst/>
           </a:prstGeom>
           <a:solidFill>
-            <a:srgbClr val="72B3E0"/>
+            <a:schemeClr val="bg1"/>
           </a:solidFill>
           <a:ln>
             <a:noFill/>
@@ -3496,12 +4156,18 @@
             <a:pPr algn="ctr"/>
             <a:r>
               <a:rPr lang="en-US" sz="1600" b="1" dirty="0" smtClean="0">
+                <a:solidFill>
+                  <a:srgbClr val="2980B9"/>
+                </a:solidFill>
                 <a:latin typeface="Segoe UI" panose="020B0502040204020203" pitchFamily="34" charset="0"/>
                 <a:cs typeface="Segoe UI" panose="020B0502040204020203" pitchFamily="34" charset="0"/>
               </a:rPr>
               <a:t>Mua Hàng</a:t>
             </a:r>
             <a:endParaRPr lang="en-US" sz="1600" b="1" dirty="0">
+              <a:solidFill>
+                <a:srgbClr val="2980B9"/>
+              </a:solidFill>
               <a:latin typeface="Segoe UI" panose="020B0502040204020203" pitchFamily="34" charset="0"/>
               <a:cs typeface="Segoe UI" panose="020B0502040204020203" pitchFamily="34" charset="0"/>
             </a:endParaRPr>
@@ -3517,13 +4183,13 @@
         <p:spPr>
           <a:xfrm>
             <a:off x="996949" y="4666488"/>
-            <a:ext cx="1545336" cy="1545336"/>
+            <a:ext cx="1545336" cy="1302512"/>
           </a:xfrm>
           <a:prstGeom prst="rect">
             <a:avLst/>
           </a:prstGeom>
           <a:solidFill>
-            <a:srgbClr val="2980B9"/>
+            <a:schemeClr val="bg1"/>
           </a:solidFill>
           <a:ln>
             <a:noFill/>
@@ -3552,12 +4218,18 @@
             <a:pPr algn="ctr"/>
             <a:r>
               <a:rPr lang="en-US" sz="1600" b="1" dirty="0" smtClean="0">
+                <a:solidFill>
+                  <a:srgbClr val="2980B9"/>
+                </a:solidFill>
                 <a:latin typeface="Segoe UI" panose="020B0502040204020203" pitchFamily="34" charset="0"/>
                 <a:cs typeface="Segoe UI" panose="020B0502040204020203" pitchFamily="34" charset="0"/>
               </a:rPr>
               <a:t>Sửa chữa</a:t>
             </a:r>
             <a:endParaRPr lang="en-US" sz="1600" b="1" dirty="0">
+              <a:solidFill>
+                <a:srgbClr val="2980B9"/>
+              </a:solidFill>
               <a:latin typeface="Segoe UI" panose="020B0502040204020203" pitchFamily="34" charset="0"/>
               <a:cs typeface="Segoe UI" panose="020B0502040204020203" pitchFamily="34" charset="0"/>
             </a:endParaRPr>
@@ -3573,13 +4245,13 @@
         <p:spPr>
           <a:xfrm>
             <a:off x="2541190" y="4666488"/>
-            <a:ext cx="1528535" cy="1545336"/>
+            <a:ext cx="1528535" cy="1302512"/>
           </a:xfrm>
           <a:prstGeom prst="rect">
             <a:avLst/>
           </a:prstGeom>
           <a:solidFill>
-            <a:srgbClr val="55A4D9"/>
+            <a:schemeClr val="bg1"/>
           </a:solidFill>
           <a:ln>
             <a:noFill/>
@@ -3608,12 +4280,18 @@
             <a:pPr algn="ctr"/>
             <a:r>
               <a:rPr lang="en-US" sz="1600" b="1" dirty="0" smtClean="0">
+                <a:solidFill>
+                  <a:srgbClr val="2980B9"/>
+                </a:solidFill>
                 <a:latin typeface="Segoe UI" panose="020B0502040204020203" pitchFamily="34" charset="0"/>
                 <a:cs typeface="Segoe UI" panose="020B0502040204020203" pitchFamily="34" charset="0"/>
               </a:rPr>
               <a:t>Liên Hệ</a:t>
             </a:r>
             <a:endParaRPr lang="en-US" sz="1600" b="1" dirty="0">
+              <a:solidFill>
+                <a:srgbClr val="2980B9"/>
+              </a:solidFill>
               <a:latin typeface="Segoe UI" panose="020B0502040204020203" pitchFamily="34" charset="0"/>
               <a:cs typeface="Segoe UI" panose="020B0502040204020203" pitchFamily="34" charset="0"/>
             </a:endParaRPr>
@@ -3642,7 +4320,7 @@
         </p:blipFill>
         <p:spPr>
           <a:xfrm>
-            <a:off x="1769070" y="2510360"/>
+            <a:off x="1769070" y="2223545"/>
             <a:ext cx="1509952" cy="1509952"/>
           </a:xfrm>
           <a:prstGeom prst="rect">
@@ -3681,7 +4359,7 @@
         </p:blipFill>
         <p:spPr>
           <a:xfrm>
-            <a:off x="1297166" y="4849627"/>
+            <a:off x="1266911" y="4659190"/>
             <a:ext cx="943809" cy="943809"/>
           </a:xfrm>
           <a:prstGeom prst="rect">
@@ -3720,7 +4398,7 @@
         </p:blipFill>
         <p:spPr>
           <a:xfrm>
-            <a:off x="2842500" y="4787867"/>
+            <a:off x="2836188" y="4646852"/>
             <a:ext cx="946547" cy="946547"/>
           </a:xfrm>
           <a:prstGeom prst="rect">
@@ -3750,7 +4428,7 @@
         </p:blipFill>
         <p:spPr>
           <a:xfrm>
-            <a:off x="6189271" y="0"/>
+            <a:off x="6991485" y="-14689"/>
             <a:ext cx="3372322" cy="6858000"/>
           </a:xfrm>
           <a:prstGeom prst="rect">
@@ -3766,7 +4444,7 @@
         </p:nvSpPr>
         <p:spPr>
           <a:xfrm>
-            <a:off x="6330951" y="682580"/>
+            <a:off x="7133165" y="667891"/>
             <a:ext cx="3072774" cy="5537916"/>
           </a:xfrm>
           <a:prstGeom prst="rect">
@@ -3812,7 +4490,7 @@
         </p:nvSpPr>
         <p:spPr>
           <a:xfrm>
-            <a:off x="7442385" y="1039911"/>
+            <a:off x="8244599" y="1025222"/>
             <a:ext cx="1276350" cy="338554"/>
           </a:xfrm>
           <a:prstGeom prst="rect">
@@ -3847,7 +4525,7 @@
         </p:nvSpPr>
         <p:spPr>
           <a:xfrm>
-            <a:off x="6510499" y="2377439"/>
+            <a:off x="7312713" y="2362750"/>
             <a:ext cx="2712720" cy="470509"/>
           </a:xfrm>
           <a:prstGeom prst="roundRect">
@@ -3910,7 +4588,7 @@
         </p:nvSpPr>
         <p:spPr>
           <a:xfrm>
-            <a:off x="6510499" y="2955818"/>
+            <a:off x="7312713" y="2941129"/>
             <a:ext cx="2712720" cy="470509"/>
           </a:xfrm>
           <a:prstGeom prst="roundRect">
@@ -3973,7 +4651,7 @@
         </p:nvSpPr>
         <p:spPr>
           <a:xfrm>
-            <a:off x="6510499" y="3534197"/>
+            <a:off x="7312713" y="3519508"/>
             <a:ext cx="2712720" cy="470509"/>
           </a:xfrm>
           <a:prstGeom prst="roundRect">
@@ -4036,7 +4714,7 @@
         </p:nvSpPr>
         <p:spPr>
           <a:xfrm>
-            <a:off x="6510499" y="4112577"/>
+            <a:off x="7312713" y="4097888"/>
             <a:ext cx="2712720" cy="1024863"/>
           </a:xfrm>
           <a:prstGeom prst="roundRect">
@@ -4099,7 +4777,7 @@
         </p:nvSpPr>
         <p:spPr>
           <a:xfrm>
-            <a:off x="6519072" y="5602999"/>
+            <a:off x="7321286" y="5588310"/>
             <a:ext cx="2712720" cy="470509"/>
           </a:xfrm>
           <a:prstGeom prst="roundRect">
@@ -4161,7 +4839,7 @@
         </p:nvSpPr>
         <p:spPr>
           <a:xfrm>
-            <a:off x="7130794" y="1302801"/>
+            <a:off x="7933008" y="1288112"/>
             <a:ext cx="1808092" cy="461665"/>
           </a:xfrm>
           <a:prstGeom prst="rect">
@@ -4199,7 +4877,7 @@
         </p:nvSpPr>
         <p:spPr>
           <a:xfrm>
-            <a:off x="6330471" y="1835693"/>
+            <a:off x="7132685" y="1821004"/>
             <a:ext cx="3072775" cy="425903"/>
           </a:xfrm>
           <a:prstGeom prst="rect">
@@ -4245,7 +4923,7 @@
         </p:nvSpPr>
         <p:spPr>
           <a:xfrm>
-            <a:off x="6439321" y="1905184"/>
+            <a:off x="7241535" y="1890495"/>
             <a:ext cx="2006127" cy="307777"/>
           </a:xfrm>
           <a:prstGeom prst="rect">
@@ -4362,6 +5040,102 @@
               <a:latin typeface="Segoe UI" panose="020B0502040204020203" pitchFamily="34" charset="0"/>
               <a:cs typeface="Segoe UI" panose="020B0502040204020203" pitchFamily="34" charset="0"/>
             </a:endParaRPr>
+          </a:p>
+        </p:txBody>
+      </p:sp>
+      <p:sp>
+        <p:nvSpPr>
+          <p:cNvPr id="28" name="Rectangle 27"/>
+          <p:cNvSpPr/>
+          <p:nvPr/>
+        </p:nvSpPr>
+        <p:spPr>
+          <a:xfrm>
+            <a:off x="996948" y="4209581"/>
+            <a:ext cx="3072775" cy="77827"/>
+          </a:xfrm>
+          <a:prstGeom prst="rect">
+            <a:avLst/>
+          </a:prstGeom>
+          <a:solidFill>
+            <a:schemeClr val="bg1">
+              <a:lumMod val="95000"/>
+            </a:schemeClr>
+          </a:solidFill>
+          <a:ln>
+            <a:noFill/>
+          </a:ln>
+        </p:spPr>
+        <p:style>
+          <a:lnRef idx="2">
+            <a:schemeClr val="accent1">
+              <a:shade val="50000"/>
+            </a:schemeClr>
+          </a:lnRef>
+          <a:fillRef idx="1">
+            <a:schemeClr val="accent1"/>
+          </a:fillRef>
+          <a:effectRef idx="0">
+            <a:schemeClr val="accent1"/>
+          </a:effectRef>
+          <a:fontRef idx="minor">
+            <a:schemeClr val="lt1"/>
+          </a:fontRef>
+        </p:style>
+        <p:txBody>
+          <a:bodyPr rtlCol="0" anchor="ctr"/>
+          <a:lstStyle/>
+          <a:p>
+            <a:pPr algn="ctr"/>
+            <a:endParaRPr lang="en-US"/>
+          </a:p>
+        </p:txBody>
+      </p:sp>
+      <p:sp>
+        <p:nvSpPr>
+          <p:cNvPr id="40" name="Rectangle 39"/>
+          <p:cNvSpPr/>
+          <p:nvPr/>
+        </p:nvSpPr>
+        <p:spPr>
+          <a:xfrm rot="16200000">
+            <a:off x="1592845" y="5179861"/>
+            <a:ext cx="1920240" cy="75286"/>
+          </a:xfrm>
+          <a:prstGeom prst="rect">
+            <a:avLst/>
+          </a:prstGeom>
+          <a:solidFill>
+            <a:schemeClr val="bg1">
+              <a:lumMod val="95000"/>
+            </a:schemeClr>
+          </a:solidFill>
+          <a:ln>
+            <a:noFill/>
+          </a:ln>
+        </p:spPr>
+        <p:style>
+          <a:lnRef idx="2">
+            <a:schemeClr val="accent1">
+              <a:shade val="50000"/>
+            </a:schemeClr>
+          </a:lnRef>
+          <a:fillRef idx="1">
+            <a:schemeClr val="accent1"/>
+          </a:fillRef>
+          <a:effectRef idx="0">
+            <a:schemeClr val="accent1"/>
+          </a:effectRef>
+          <a:fontRef idx="minor">
+            <a:schemeClr val="lt1"/>
+          </a:fontRef>
+        </p:style>
+        <p:txBody>
+          <a:bodyPr rtlCol="0" anchor="ctr"/>
+          <a:lstStyle/>
+          <a:p>
+            <a:pPr algn="ctr"/>
+            <a:endParaRPr lang="en-US"/>
           </a:p>
         </p:txBody>
       </p:sp>

</xml_diff>